<commit_message>
misc tweaks for central ohio day of .net
</commit_message>
<xml_diff>
--- a/2012/CODODN/XAML_StylesAndTemplates.pptx
+++ b/2012/CODODN/XAML_StylesAndTemplates.pptx
@@ -5,24 +5,25 @@
     <p:sldMasterId id="2147483648" r:id="rId1"/>
   </p:sldMasterIdLst>
   <p:notesMasterIdLst>
-    <p:notesMasterId r:id="rId17"/>
+    <p:notesMasterId r:id="rId18"/>
   </p:notesMasterIdLst>
   <p:sldIdLst>
-    <p:sldId id="263" r:id="rId2"/>
-    <p:sldId id="256" r:id="rId3"/>
-    <p:sldId id="257" r:id="rId4"/>
-    <p:sldId id="264" r:id="rId5"/>
-    <p:sldId id="258" r:id="rId6"/>
-    <p:sldId id="260" r:id="rId7"/>
-    <p:sldId id="265" r:id="rId8"/>
-    <p:sldId id="266" r:id="rId9"/>
-    <p:sldId id="267" r:id="rId10"/>
-    <p:sldId id="268" r:id="rId11"/>
-    <p:sldId id="269" r:id="rId12"/>
-    <p:sldId id="270" r:id="rId13"/>
-    <p:sldId id="271" r:id="rId14"/>
-    <p:sldId id="272" r:id="rId15"/>
-    <p:sldId id="262" r:id="rId16"/>
+    <p:sldId id="273" r:id="rId2"/>
+    <p:sldId id="263" r:id="rId3"/>
+    <p:sldId id="256" r:id="rId4"/>
+    <p:sldId id="257" r:id="rId5"/>
+    <p:sldId id="264" r:id="rId6"/>
+    <p:sldId id="258" r:id="rId7"/>
+    <p:sldId id="260" r:id="rId8"/>
+    <p:sldId id="265" r:id="rId9"/>
+    <p:sldId id="266" r:id="rId10"/>
+    <p:sldId id="267" r:id="rId11"/>
+    <p:sldId id="268" r:id="rId12"/>
+    <p:sldId id="269" r:id="rId13"/>
+    <p:sldId id="270" r:id="rId14"/>
+    <p:sldId id="271" r:id="rId15"/>
+    <p:sldId id="272" r:id="rId16"/>
+    <p:sldId id="262" r:id="rId17"/>
   </p:sldIdLst>
   <p:sldSz cx="9144000" cy="6858000" type="screen4x3"/>
   <p:notesSz cx="6858000" cy="9144000"/>
@@ -206,7 +207,7 @@
           <a:p>
             <a:fld id="{85251BA3-7574-4D08-8FFE-AFDFCBCB0032}" type="datetimeFigureOut">
               <a:rPr lang="en-US" smtClean="0"/>
-              <a:t>12/5/2012</a:t>
+              <a:t>12/7/2012</a:t>
             </a:fld>
             <a:endParaRPr lang="en-US"/>
           </a:p>
@@ -568,7 +569,7 @@
           <a:p>
             <a:fld id="{5D196DFA-6F1B-497F-B5BA-EC737023875D}" type="slidenum">
               <a:rPr lang="en-US" smtClean="0"/>
-              <a:t>7</a:t>
+              <a:t>8</a:t>
             </a:fld>
             <a:endParaRPr lang="en-US"/>
           </a:p>
@@ -769,7 +770,7 @@
             <a:fld id="{1D8BD707-D9CF-40AE-B4C6-C98DA3205C09}" type="datetimeFigureOut">
               <a:rPr lang="en-US" smtClean="0"/>
               <a:pPr/>
-              <a:t>12/5/2012</a:t>
+              <a:t>12/7/2012</a:t>
             </a:fld>
             <a:endParaRPr lang="en-US"/>
           </a:p>
@@ -936,7 +937,7 @@
             <a:fld id="{1D8BD707-D9CF-40AE-B4C6-C98DA3205C09}" type="datetimeFigureOut">
               <a:rPr lang="en-US" smtClean="0"/>
               <a:pPr/>
-              <a:t>12/5/2012</a:t>
+              <a:t>12/7/2012</a:t>
             </a:fld>
             <a:endParaRPr lang="en-US"/>
           </a:p>
@@ -1113,7 +1114,7 @@
             <a:fld id="{1D8BD707-D9CF-40AE-B4C6-C98DA3205C09}" type="datetimeFigureOut">
               <a:rPr lang="en-US" smtClean="0"/>
               <a:pPr/>
-              <a:t>12/5/2012</a:t>
+              <a:t>12/7/2012</a:t>
             </a:fld>
             <a:endParaRPr lang="en-US"/>
           </a:p>
@@ -1347,7 +1348,7 @@
             <a:fld id="{1D8BD707-D9CF-40AE-B4C6-C98DA3205C09}" type="datetimeFigureOut">
               <a:rPr lang="en-US" smtClean="0"/>
               <a:pPr/>
-              <a:t>12/5/2012</a:t>
+              <a:t>12/7/2012</a:t>
             </a:fld>
             <a:endParaRPr lang="en-US"/>
           </a:p>
@@ -1590,7 +1591,7 @@
             <a:fld id="{1D8BD707-D9CF-40AE-B4C6-C98DA3205C09}" type="datetimeFigureOut">
               <a:rPr lang="en-US" smtClean="0"/>
               <a:pPr/>
-              <a:t>12/5/2012</a:t>
+              <a:t>12/7/2012</a:t>
             </a:fld>
             <a:endParaRPr lang="en-US"/>
           </a:p>
@@ -1875,7 +1876,7 @@
             <a:fld id="{1D8BD707-D9CF-40AE-B4C6-C98DA3205C09}" type="datetimeFigureOut">
               <a:rPr lang="en-US" smtClean="0"/>
               <a:pPr/>
-              <a:t>12/5/2012</a:t>
+              <a:t>12/7/2012</a:t>
             </a:fld>
             <a:endParaRPr lang="en-US"/>
           </a:p>
@@ -2294,7 +2295,7 @@
             <a:fld id="{1D8BD707-D9CF-40AE-B4C6-C98DA3205C09}" type="datetimeFigureOut">
               <a:rPr lang="en-US" smtClean="0"/>
               <a:pPr/>
-              <a:t>12/5/2012</a:t>
+              <a:t>12/7/2012</a:t>
             </a:fld>
             <a:endParaRPr lang="en-US"/>
           </a:p>
@@ -2409,7 +2410,7 @@
             <a:fld id="{1D8BD707-D9CF-40AE-B4C6-C98DA3205C09}" type="datetimeFigureOut">
               <a:rPr lang="en-US" smtClean="0"/>
               <a:pPr/>
-              <a:t>12/5/2012</a:t>
+              <a:t>12/7/2012</a:t>
             </a:fld>
             <a:endParaRPr lang="en-US"/>
           </a:p>
@@ -2501,7 +2502,7 @@
             <a:fld id="{1D8BD707-D9CF-40AE-B4C6-C98DA3205C09}" type="datetimeFigureOut">
               <a:rPr lang="en-US" smtClean="0"/>
               <a:pPr/>
-              <a:t>12/5/2012</a:t>
+              <a:t>12/7/2012</a:t>
             </a:fld>
             <a:endParaRPr lang="en-US"/>
           </a:p>
@@ -2775,7 +2776,7 @@
             <a:fld id="{1D8BD707-D9CF-40AE-B4C6-C98DA3205C09}" type="datetimeFigureOut">
               <a:rPr lang="en-US" smtClean="0"/>
               <a:pPr/>
-              <a:t>12/5/2012</a:t>
+              <a:t>12/7/2012</a:t>
             </a:fld>
             <a:endParaRPr lang="en-US"/>
           </a:p>
@@ -3025,7 +3026,7 @@
             <a:fld id="{1D8BD707-D9CF-40AE-B4C6-C98DA3205C09}" type="datetimeFigureOut">
               <a:rPr lang="en-US" smtClean="0"/>
               <a:pPr/>
-              <a:t>12/5/2012</a:t>
+              <a:t>12/7/2012</a:t>
             </a:fld>
             <a:endParaRPr lang="en-US"/>
           </a:p>
@@ -3235,7 +3236,7 @@
             <a:fld id="{1D8BD707-D9CF-40AE-B4C6-C98DA3205C09}" type="datetimeFigureOut">
               <a:rPr lang="en-US" smtClean="0"/>
               <a:pPr/>
-              <a:t>12/5/2012</a:t>
+              <a:t>12/7/2012</a:t>
             </a:fld>
             <a:endParaRPr lang="en-US"/>
           </a:p>
@@ -3607,280 +3608,241 @@
           <a:chExt cx="0" cy="0"/>
         </a:xfrm>
       </p:grpSpPr>
-      <p:sp>
-        <p:nvSpPr>
-          <p:cNvPr id="2" name="Title 1"/>
-          <p:cNvSpPr>
-            <a:spLocks noGrp="1"/>
-          </p:cNvSpPr>
-          <p:nvPr>
-            <p:ph type="ctrTitle"/>
-          </p:nvPr>
-        </p:nvSpPr>
-        <p:spPr/>
-        <p:txBody>
-          <a:bodyPr/>
-          <a:lstStyle/>
-          <a:p>
-            <a:r>
-              <a:rPr lang="en-US" smtClean="0"/>
-              <a:t>XAML: Styles and Templates</a:t>
-            </a:r>
-            <a:endParaRPr lang="en-US" dirty="0"/>
-          </a:p>
-        </p:txBody>
-      </p:sp>
-      <p:sp>
-        <p:nvSpPr>
-          <p:cNvPr id="3" name="Subtitle 2"/>
-          <p:cNvSpPr>
-            <a:spLocks noGrp="1"/>
-          </p:cNvSpPr>
-          <p:nvPr>
-            <p:ph type="subTitle" idx="1"/>
-          </p:nvPr>
-        </p:nvSpPr>
-        <p:spPr/>
-        <p:txBody>
-          <a:bodyPr/>
-          <a:lstStyle/>
-          <a:p>
-            <a:r>
-              <a:rPr lang="en-US" dirty="0" smtClean="0"/>
-              <a:t>Central Ohio Day of .NET</a:t>
-            </a:r>
-          </a:p>
-          <a:p>
-            <a:r>
-              <a:rPr lang="en-US" dirty="0" smtClean="0"/>
-              <a:t>December 8, 2012</a:t>
-            </a:r>
-            <a:endParaRPr lang="en-US" dirty="0"/>
-          </a:p>
-        </p:txBody>
-      </p:sp>
-      <p:sp>
-        <p:nvSpPr>
-          <p:cNvPr id="4" name="Subtitle 2"/>
-          <p:cNvSpPr txBox="1">
-            <a:spLocks/>
-          </p:cNvSpPr>
-          <p:nvPr/>
-        </p:nvSpPr>
-        <p:spPr>
-          <a:xfrm>
-            <a:off x="6477000" y="5580460"/>
-            <a:ext cx="2514600" cy="1143000"/>
-          </a:xfrm>
-          <a:prstGeom prst="rect">
-            <a:avLst/>
-          </a:prstGeom>
-        </p:spPr>
-        <p:txBody>
-          <a:bodyPr vert="horz" lIns="91440" tIns="45720" rIns="91440" bIns="45720" rtlCol="0">
-            <a:noAutofit/>
-          </a:bodyPr>
-          <a:lstStyle>
-            <a:lvl1pPr marL="0" indent="0" algn="ctr" defTabSz="914400" rtl="0" eaLnBrk="1" latinLnBrk="0" hangingPunct="1">
-              <a:spcBef>
-                <a:spcPct val="20000"/>
-              </a:spcBef>
-              <a:buFont typeface="Arial" pitchFamily="34" charset="0"/>
-              <a:buNone/>
-              <a:defRPr sz="3200" kern="1200">
-                <a:solidFill>
-                  <a:schemeClr val="tx1">
-                    <a:tint val="75000"/>
-                  </a:schemeClr>
-                </a:solidFill>
-                <a:latin typeface="+mn-lt"/>
-                <a:ea typeface="+mn-ea"/>
-                <a:cs typeface="+mn-cs"/>
-              </a:defRPr>
-            </a:lvl1pPr>
-            <a:lvl2pPr marL="457200" indent="0" algn="ctr" defTabSz="914400" rtl="0" eaLnBrk="1" latinLnBrk="0" hangingPunct="1">
-              <a:spcBef>
-                <a:spcPct val="20000"/>
-              </a:spcBef>
-              <a:buFont typeface="Arial" pitchFamily="34" charset="0"/>
-              <a:buNone/>
-              <a:defRPr sz="2800" kern="1200">
-                <a:solidFill>
-                  <a:schemeClr val="tx1">
-                    <a:tint val="75000"/>
-                  </a:schemeClr>
-                </a:solidFill>
-                <a:latin typeface="+mn-lt"/>
-                <a:ea typeface="+mn-ea"/>
-                <a:cs typeface="+mn-cs"/>
-              </a:defRPr>
-            </a:lvl2pPr>
-            <a:lvl3pPr marL="914400" indent="0" algn="ctr" defTabSz="914400" rtl="0" eaLnBrk="1" latinLnBrk="0" hangingPunct="1">
-              <a:spcBef>
-                <a:spcPct val="20000"/>
-              </a:spcBef>
-              <a:buFont typeface="Arial" pitchFamily="34" charset="0"/>
-              <a:buNone/>
-              <a:defRPr sz="2400" kern="1200">
-                <a:solidFill>
-                  <a:schemeClr val="tx1">
-                    <a:tint val="75000"/>
-                  </a:schemeClr>
-                </a:solidFill>
-                <a:latin typeface="+mn-lt"/>
-                <a:ea typeface="+mn-ea"/>
-                <a:cs typeface="+mn-cs"/>
-              </a:defRPr>
-            </a:lvl3pPr>
-            <a:lvl4pPr marL="1371600" indent="0" algn="ctr" defTabSz="914400" rtl="0" eaLnBrk="1" latinLnBrk="0" hangingPunct="1">
-              <a:spcBef>
-                <a:spcPct val="20000"/>
-              </a:spcBef>
-              <a:buFont typeface="Arial" pitchFamily="34" charset="0"/>
-              <a:buNone/>
-              <a:defRPr sz="2000" kern="1200">
-                <a:solidFill>
-                  <a:schemeClr val="tx1">
-                    <a:tint val="75000"/>
-                  </a:schemeClr>
-                </a:solidFill>
-                <a:latin typeface="+mn-lt"/>
-                <a:ea typeface="+mn-ea"/>
-                <a:cs typeface="+mn-cs"/>
-              </a:defRPr>
-            </a:lvl4pPr>
-            <a:lvl5pPr marL="1828800" indent="0" algn="ctr" defTabSz="914400" rtl="0" eaLnBrk="1" latinLnBrk="0" hangingPunct="1">
-              <a:spcBef>
-                <a:spcPct val="20000"/>
-              </a:spcBef>
-              <a:buFont typeface="Arial" pitchFamily="34" charset="0"/>
-              <a:buNone/>
-              <a:defRPr sz="2000" kern="1200">
-                <a:solidFill>
-                  <a:schemeClr val="tx1">
-                    <a:tint val="75000"/>
-                  </a:schemeClr>
-                </a:solidFill>
-                <a:latin typeface="+mn-lt"/>
-                <a:ea typeface="+mn-ea"/>
-                <a:cs typeface="+mn-cs"/>
-              </a:defRPr>
-            </a:lvl5pPr>
-            <a:lvl6pPr marL="2286000" indent="0" algn="ctr" defTabSz="914400" rtl="0" eaLnBrk="1" latinLnBrk="0" hangingPunct="1">
-              <a:spcBef>
-                <a:spcPct val="20000"/>
-              </a:spcBef>
-              <a:buFont typeface="Arial" pitchFamily="34" charset="0"/>
-              <a:buNone/>
-              <a:defRPr sz="2000" kern="1200">
-                <a:solidFill>
-                  <a:schemeClr val="tx1">
-                    <a:tint val="75000"/>
-                  </a:schemeClr>
-                </a:solidFill>
-                <a:latin typeface="+mn-lt"/>
-                <a:ea typeface="+mn-ea"/>
-                <a:cs typeface="+mn-cs"/>
-              </a:defRPr>
-            </a:lvl6pPr>
-            <a:lvl7pPr marL="2743200" indent="0" algn="ctr" defTabSz="914400" rtl="0" eaLnBrk="1" latinLnBrk="0" hangingPunct="1">
-              <a:spcBef>
-                <a:spcPct val="20000"/>
-              </a:spcBef>
-              <a:buFont typeface="Arial" pitchFamily="34" charset="0"/>
-              <a:buNone/>
-              <a:defRPr sz="2000" kern="1200">
-                <a:solidFill>
-                  <a:schemeClr val="tx1">
-                    <a:tint val="75000"/>
-                  </a:schemeClr>
-                </a:solidFill>
-                <a:latin typeface="+mn-lt"/>
-                <a:ea typeface="+mn-ea"/>
-                <a:cs typeface="+mn-cs"/>
-              </a:defRPr>
-            </a:lvl7pPr>
-            <a:lvl8pPr marL="3200400" indent="0" algn="ctr" defTabSz="914400" rtl="0" eaLnBrk="1" latinLnBrk="0" hangingPunct="1">
-              <a:spcBef>
-                <a:spcPct val="20000"/>
-              </a:spcBef>
-              <a:buFont typeface="Arial" pitchFamily="34" charset="0"/>
-              <a:buNone/>
-              <a:defRPr sz="2000" kern="1200">
-                <a:solidFill>
-                  <a:schemeClr val="tx1">
-                    <a:tint val="75000"/>
-                  </a:schemeClr>
-                </a:solidFill>
-                <a:latin typeface="+mn-lt"/>
-                <a:ea typeface="+mn-ea"/>
-                <a:cs typeface="+mn-cs"/>
-              </a:defRPr>
-            </a:lvl8pPr>
-            <a:lvl9pPr marL="3657600" indent="0" algn="ctr" defTabSz="914400" rtl="0" eaLnBrk="1" latinLnBrk="0" hangingPunct="1">
-              <a:spcBef>
-                <a:spcPct val="20000"/>
-              </a:spcBef>
-              <a:buFont typeface="Arial" pitchFamily="34" charset="0"/>
-              <a:buNone/>
-              <a:defRPr sz="2000" kern="1200">
-                <a:solidFill>
-                  <a:schemeClr val="tx1">
-                    <a:tint val="75000"/>
-                  </a:schemeClr>
-                </a:solidFill>
-                <a:latin typeface="+mn-lt"/>
-                <a:ea typeface="+mn-ea"/>
-                <a:cs typeface="+mn-cs"/>
-              </a:defRPr>
-            </a:lvl9pPr>
-          </a:lstStyle>
-          <a:p>
-            <a:pPr algn="r"/>
-            <a:r>
-              <a:rPr lang="en-US" sz="1400" dirty="0" smtClean="0"/>
-              <a:t/>
-            </a:r>
-            <a:br>
-              <a:rPr lang="en-US" sz="1400" dirty="0" smtClean="0"/>
-            </a:br>
-            <a:r>
-              <a:rPr lang="en-US" sz="1400" dirty="0" smtClean="0"/>
-              <a:t>Michael Eaton</a:t>
-            </a:r>
-          </a:p>
-          <a:p>
-            <a:pPr algn="r"/>
-            <a:r>
-              <a:rPr lang="en-US" sz="1400" dirty="0" smtClean="0"/>
-              <a:t>@</a:t>
-            </a:r>
-            <a:r>
-              <a:rPr lang="en-US" sz="1400" dirty="0" err="1" smtClean="0"/>
-              <a:t>mjeaton</a:t>
-            </a:r>
-            <a:endParaRPr lang="en-US" sz="1400" dirty="0"/>
-          </a:p>
-        </p:txBody>
-      </p:sp>
       <p:pic>
         <p:nvPicPr>
-          <p:cNvPr id="5" name="Picture 4" descr="Validus_Color_Trans.jpg"/>
+          <p:cNvPr id="5" name="Picture 4"/>
           <p:cNvPicPr>
             <a:picLocks noChangeAspect="1"/>
           </p:cNvPicPr>
           <p:nvPr/>
         </p:nvPicPr>
         <p:blipFill>
-          <a:blip r:embed="rId2" cstate="print"/>
+          <a:blip r:embed="rId2">
+            <a:extLst>
+              <a:ext uri="{28A0092B-C50C-407E-A947-70E740481C1C}">
+                <a14:useLocalDpi xmlns:a14="http://schemas.microsoft.com/office/drawing/2010/main" val="0"/>
+              </a:ext>
+            </a:extLst>
+          </a:blip>
           <a:stretch>
             <a:fillRect/>
           </a:stretch>
         </p:blipFill>
         <p:spPr>
           <a:xfrm>
-            <a:off x="215900" y="5857186"/>
-            <a:ext cx="2057400" cy="866274"/>
+            <a:off x="152400" y="0"/>
+            <a:ext cx="6096000" cy="2914650"/>
+          </a:xfrm>
+          <a:prstGeom prst="rect">
+            <a:avLst/>
+          </a:prstGeom>
+        </p:spPr>
+      </p:pic>
+      <p:pic>
+        <p:nvPicPr>
+          <p:cNvPr id="8" name="Picture 7"/>
+          <p:cNvPicPr>
+            <a:picLocks noChangeAspect="1"/>
+          </p:cNvPicPr>
+          <p:nvPr/>
+        </p:nvPicPr>
+        <p:blipFill>
+          <a:blip r:embed="rId3">
+            <a:extLst>
+              <a:ext uri="{28A0092B-C50C-407E-A947-70E740481C1C}">
+                <a14:useLocalDpi xmlns:a14="http://schemas.microsoft.com/office/drawing/2010/main" val="0"/>
+              </a:ext>
+            </a:extLst>
+          </a:blip>
+          <a:stretch>
+            <a:fillRect/>
+          </a:stretch>
+        </p:blipFill>
+        <p:spPr>
+          <a:xfrm>
+            <a:off x="4724400" y="4762500"/>
+            <a:ext cx="4286250" cy="1714500"/>
+          </a:xfrm>
+          <a:prstGeom prst="rect">
+            <a:avLst/>
+          </a:prstGeom>
+        </p:spPr>
+      </p:pic>
+      <p:sp>
+        <p:nvSpPr>
+          <p:cNvPr id="9" name="TextBox 8"/>
+          <p:cNvSpPr txBox="1"/>
+          <p:nvPr/>
+        </p:nvSpPr>
+        <p:spPr>
+          <a:xfrm>
+            <a:off x="6019800" y="2436674"/>
+            <a:ext cx="2971800" cy="1754326"/>
+          </a:xfrm>
+          <a:prstGeom prst="rect">
+            <a:avLst/>
+          </a:prstGeom>
+          <a:noFill/>
+        </p:spPr>
+        <p:txBody>
+          <a:bodyPr wrap="square" rtlCol="0">
+            <a:spAutoFit/>
+          </a:bodyPr>
+          <a:lstStyle/>
+          <a:p>
+            <a:pPr algn="ctr"/>
+            <a:r>
+              <a:rPr lang="en-US" sz="3600" b="1" dirty="0" smtClean="0"/>
+              <a:t>Thanks to our AWESOME sponsors!</a:t>
+            </a:r>
+            <a:endParaRPr lang="en-US" sz="3600" b="1" dirty="0"/>
+          </a:p>
+        </p:txBody>
+      </p:sp>
+      <p:pic>
+        <p:nvPicPr>
+          <p:cNvPr id="2" name="Picture 1"/>
+          <p:cNvPicPr>
+            <a:picLocks noChangeAspect="1"/>
+          </p:cNvPicPr>
+          <p:nvPr/>
+        </p:nvPicPr>
+        <p:blipFill>
+          <a:blip r:embed="rId4">
+            <a:extLst>
+              <a:ext uri="{28A0092B-C50C-407E-A947-70E740481C1C}">
+                <a14:useLocalDpi xmlns:a14="http://schemas.microsoft.com/office/drawing/2010/main" val="0"/>
+              </a:ext>
+            </a:extLst>
+          </a:blip>
+          <a:stretch>
+            <a:fillRect/>
+          </a:stretch>
+        </p:blipFill>
+        <p:spPr>
+          <a:xfrm>
+            <a:off x="381001" y="2743200"/>
+            <a:ext cx="5029200" cy="1293638"/>
+          </a:xfrm>
+          <a:prstGeom prst="rect">
+            <a:avLst/>
+          </a:prstGeom>
+        </p:spPr>
+      </p:pic>
+      <p:pic>
+        <p:nvPicPr>
+          <p:cNvPr id="3" name="Picture 2"/>
+          <p:cNvPicPr>
+            <a:picLocks noChangeAspect="1"/>
+          </p:cNvPicPr>
+          <p:nvPr/>
+        </p:nvPicPr>
+        <p:blipFill>
+          <a:blip r:embed="rId5" cstate="print">
+            <a:extLst>
+              <a:ext uri="{28A0092B-C50C-407E-A947-70E740481C1C}">
+                <a14:useLocalDpi xmlns:a14="http://schemas.microsoft.com/office/drawing/2010/main" val="0"/>
+              </a:ext>
+            </a:extLst>
+          </a:blip>
+          <a:stretch>
+            <a:fillRect/>
+          </a:stretch>
+        </p:blipFill>
+        <p:spPr>
+          <a:xfrm>
+            <a:off x="311727" y="152400"/>
+            <a:ext cx="3048781" cy="801829"/>
+          </a:xfrm>
+          <a:prstGeom prst="rect">
+            <a:avLst/>
+          </a:prstGeom>
+        </p:spPr>
+      </p:pic>
+      <p:pic>
+        <p:nvPicPr>
+          <p:cNvPr id="10" name="Picture 9"/>
+          <p:cNvPicPr>
+            <a:picLocks noChangeAspect="1"/>
+          </p:cNvPicPr>
+          <p:nvPr/>
+        </p:nvPicPr>
+        <p:blipFill>
+          <a:blip r:embed="rId6">
+            <a:extLst>
+              <a:ext uri="{28A0092B-C50C-407E-A947-70E740481C1C}">
+                <a14:useLocalDpi xmlns:a14="http://schemas.microsoft.com/office/drawing/2010/main" val="0"/>
+              </a:ext>
+            </a:extLst>
+          </a:blip>
+          <a:stretch>
+            <a:fillRect/>
+          </a:stretch>
+        </p:blipFill>
+        <p:spPr>
+          <a:xfrm>
+            <a:off x="6500289" y="27709"/>
+            <a:ext cx="2641203" cy="2112962"/>
+          </a:xfrm>
+          <a:prstGeom prst="rect">
+            <a:avLst/>
+          </a:prstGeom>
+        </p:spPr>
+      </p:pic>
+      <p:pic>
+        <p:nvPicPr>
+          <p:cNvPr id="11" name="Picture 10"/>
+          <p:cNvPicPr>
+            <a:picLocks noChangeAspect="1"/>
+          </p:cNvPicPr>
+          <p:nvPr/>
+        </p:nvPicPr>
+        <p:blipFill>
+          <a:blip r:embed="rId7">
+            <a:extLst>
+              <a:ext uri="{28A0092B-C50C-407E-A947-70E740481C1C}">
+                <a14:useLocalDpi xmlns:a14="http://schemas.microsoft.com/office/drawing/2010/main" val="0"/>
+              </a:ext>
+            </a:extLst>
+          </a:blip>
+          <a:stretch>
+            <a:fillRect/>
+          </a:stretch>
+        </p:blipFill>
+        <p:spPr>
+          <a:xfrm>
+            <a:off x="1143000" y="5445701"/>
+            <a:ext cx="2514600" cy="881185"/>
+          </a:xfrm>
+          <a:prstGeom prst="rect">
+            <a:avLst/>
+          </a:prstGeom>
+        </p:spPr>
+      </p:pic>
+      <p:pic>
+        <p:nvPicPr>
+          <p:cNvPr id="12" name="Picture 11"/>
+          <p:cNvPicPr>
+            <a:picLocks noChangeAspect="1"/>
+          </p:cNvPicPr>
+          <p:nvPr/>
+        </p:nvPicPr>
+        <p:blipFill>
+          <a:blip r:embed="rId8">
+            <a:extLst>
+              <a:ext uri="{28A0092B-C50C-407E-A947-70E740481C1C}">
+                <a14:useLocalDpi xmlns:a14="http://schemas.microsoft.com/office/drawing/2010/main" val="0"/>
+              </a:ext>
+            </a:extLst>
+          </a:blip>
+          <a:stretch>
+            <a:fillRect/>
+          </a:stretch>
+        </p:blipFill>
+        <p:spPr>
+          <a:xfrm>
+            <a:off x="609600" y="4079299"/>
+            <a:ext cx="4127496" cy="1407101"/>
           </a:xfrm>
           <a:prstGeom prst="rect">
             <a:avLst/>
@@ -3890,13 +3852,349 @@
     </p:spTree>
     <p:extLst>
       <p:ext uri="{BB962C8B-B14F-4D97-AF65-F5344CB8AC3E}">
-        <p14:creationId xmlns:p14="http://schemas.microsoft.com/office/powerpoint/2010/main" val="1693764814"/>
+        <p14:creationId xmlns:p14="http://schemas.microsoft.com/office/powerpoint/2010/main" val="681366504"/>
       </p:ext>
     </p:extLst>
   </p:cSld>
   <p:clrMapOvr>
     <a:masterClrMapping/>
   </p:clrMapOvr>
+</p:sld>
+</file>
+
+<file path=ppt/slides/slide10.xml><?xml version="1.0" encoding="utf-8"?>
+<p:sld xmlns:a="http://schemas.openxmlformats.org/drawingml/2006/main" xmlns:r="http://schemas.openxmlformats.org/officeDocument/2006/relationships" xmlns:p="http://schemas.openxmlformats.org/presentationml/2006/main">
+  <p:cSld>
+    <p:spTree>
+      <p:nvGrpSpPr>
+        <p:cNvPr id="1" name=""/>
+        <p:cNvGrpSpPr/>
+        <p:nvPr/>
+      </p:nvGrpSpPr>
+      <p:grpSpPr>
+        <a:xfrm>
+          <a:off x="0" y="0"/>
+          <a:ext cx="0" cy="0"/>
+          <a:chOff x="0" y="0"/>
+          <a:chExt cx="0" cy="0"/>
+        </a:xfrm>
+      </p:grpSpPr>
+      <p:sp>
+        <p:nvSpPr>
+          <p:cNvPr id="2" name="Title 1"/>
+          <p:cNvSpPr>
+            <a:spLocks noGrp="1"/>
+          </p:cNvSpPr>
+          <p:nvPr>
+            <p:ph type="title"/>
+          </p:nvPr>
+        </p:nvSpPr>
+        <p:spPr/>
+        <p:txBody>
+          <a:bodyPr/>
+          <a:lstStyle/>
+          <a:p>
+            <a:r>
+              <a:rPr lang="en-US" dirty="0" smtClean="0"/>
+              <a:t>Styles</a:t>
+            </a:r>
+            <a:endParaRPr lang="en-US" dirty="0"/>
+          </a:p>
+        </p:txBody>
+      </p:sp>
+      <p:sp>
+        <p:nvSpPr>
+          <p:cNvPr id="3" name="Content Placeholder 2"/>
+          <p:cNvSpPr>
+            <a:spLocks noGrp="1"/>
+          </p:cNvSpPr>
+          <p:nvPr>
+            <p:ph idx="1"/>
+          </p:nvPr>
+        </p:nvSpPr>
+        <p:spPr/>
+        <p:txBody>
+          <a:bodyPr>
+            <a:normAutofit/>
+          </a:bodyPr>
+          <a:lstStyle/>
+          <a:p>
+            <a:r>
+              <a:rPr lang="en-US" sz="2800" dirty="0" smtClean="0"/>
+              <a:t>Styles can live in several places</a:t>
+            </a:r>
+          </a:p>
+          <a:p>
+            <a:pPr lvl="1"/>
+            <a:r>
+              <a:rPr lang="en-US" sz="2000" dirty="0" err="1" smtClean="0"/>
+              <a:t>App.xaml</a:t>
+            </a:r>
+            <a:endParaRPr lang="en-US" sz="2000" dirty="0" smtClean="0"/>
+          </a:p>
+          <a:p>
+            <a:pPr lvl="2"/>
+            <a:r>
+              <a:rPr lang="en-US" sz="1600" dirty="0" smtClean="0"/>
+              <a:t>&lt;</a:t>
+            </a:r>
+            <a:r>
+              <a:rPr lang="en-US" sz="1600" dirty="0" err="1" smtClean="0"/>
+              <a:t>Application.Resources</a:t>
+            </a:r>
+            <a:r>
+              <a:rPr lang="en-US" sz="1600" dirty="0" smtClean="0"/>
+              <a:t>&gt;</a:t>
+            </a:r>
+          </a:p>
+          <a:p>
+            <a:pPr lvl="3"/>
+            <a:r>
+              <a:rPr lang="en-US" sz="1200" dirty="0" smtClean="0"/>
+              <a:t>Available globally</a:t>
+            </a:r>
+          </a:p>
+          <a:p>
+            <a:pPr lvl="1"/>
+            <a:r>
+              <a:rPr lang="en-US" sz="2000" dirty="0" smtClean="0"/>
+              <a:t>&lt;</a:t>
+            </a:r>
+            <a:r>
+              <a:rPr lang="en-US" sz="2000" dirty="0" err="1" smtClean="0"/>
+              <a:t>Window|Page|UserControl.Resources</a:t>
+            </a:r>
+            <a:r>
+              <a:rPr lang="en-US" sz="2000" dirty="0" smtClean="0"/>
+              <a:t>/&gt;</a:t>
+            </a:r>
+          </a:p>
+          <a:p>
+            <a:pPr lvl="2"/>
+            <a:r>
+              <a:rPr lang="en-US" sz="1600" dirty="0" smtClean="0"/>
+              <a:t>Available only within that particular window, page or </a:t>
+            </a:r>
+            <a:r>
+              <a:rPr lang="en-US" sz="1600" dirty="0" err="1" smtClean="0"/>
+              <a:t>usercontrol</a:t>
+            </a:r>
+            <a:endParaRPr lang="en-US" sz="1600" dirty="0" smtClean="0"/>
+          </a:p>
+          <a:p>
+            <a:pPr lvl="1"/>
+            <a:r>
+              <a:rPr lang="en-US" sz="2000" dirty="0" smtClean="0"/>
+              <a:t>&lt;</a:t>
+            </a:r>
+            <a:r>
+              <a:rPr lang="en-US" sz="2000" dirty="0" err="1" smtClean="0"/>
+              <a:t>Control.Resources</a:t>
+            </a:r>
+            <a:r>
+              <a:rPr lang="en-US" sz="2000" dirty="0" smtClean="0"/>
+              <a:t>&gt;</a:t>
+            </a:r>
+          </a:p>
+          <a:p>
+            <a:pPr lvl="2"/>
+            <a:r>
+              <a:rPr lang="en-US" sz="1600" dirty="0" smtClean="0"/>
+              <a:t>&lt;</a:t>
+            </a:r>
+            <a:r>
+              <a:rPr lang="en-US" sz="1600" dirty="0" err="1" smtClean="0"/>
+              <a:t>Button.Resources</a:t>
+            </a:r>
+            <a:r>
+              <a:rPr lang="en-US" sz="1600" dirty="0" smtClean="0"/>
+              <a:t>&gt;, &lt;</a:t>
+            </a:r>
+            <a:r>
+              <a:rPr lang="en-US" sz="1600" dirty="0" err="1" smtClean="0"/>
+              <a:t>Grid.Resources</a:t>
+            </a:r>
+            <a:r>
+              <a:rPr lang="en-US" sz="1600" dirty="0" smtClean="0"/>
+              <a:t>&gt;, etc.</a:t>
+            </a:r>
+          </a:p>
+          <a:p>
+            <a:pPr lvl="2"/>
+            <a:r>
+              <a:rPr lang="en-US" sz="1600" dirty="0" smtClean="0"/>
+              <a:t>Only available within the context of that particular control</a:t>
+            </a:r>
+          </a:p>
+        </p:txBody>
+      </p:sp>
+      <p:sp>
+        <p:nvSpPr>
+          <p:cNvPr id="5" name="Rectangle 4"/>
+          <p:cNvSpPr/>
+          <p:nvPr/>
+        </p:nvSpPr>
+        <p:spPr>
+          <a:xfrm>
+            <a:off x="4038600" y="4728358"/>
+            <a:ext cx="4572000" cy="1169551"/>
+          </a:xfrm>
+          <a:prstGeom prst="rect">
+            <a:avLst/>
+          </a:prstGeom>
+        </p:spPr>
+        <p:txBody>
+          <a:bodyPr>
+            <a:spAutoFit/>
+          </a:bodyPr>
+          <a:lstStyle/>
+          <a:p>
+            <a:r>
+              <a:rPr lang="en-US" sz="1400" dirty="0"/>
+              <a:t>&lt;Style </a:t>
+            </a:r>
+            <a:r>
+              <a:rPr lang="en-US" sz="1400" dirty="0" err="1"/>
+              <a:t>TargetType</a:t>
+            </a:r>
+            <a:r>
+              <a:rPr lang="en-US" sz="1400" dirty="0"/>
+              <a:t>=“Button”&gt;</a:t>
+            </a:r>
+          </a:p>
+          <a:p>
+            <a:r>
+              <a:rPr lang="en-US" sz="1400" dirty="0"/>
+              <a:t>    &lt;Setter Property=“</a:t>
+            </a:r>
+            <a:r>
+              <a:rPr lang="en-US" sz="1400" dirty="0" err="1"/>
+              <a:t>FontSize</a:t>
+            </a:r>
+            <a:r>
+              <a:rPr lang="en-US" sz="1400" dirty="0"/>
+              <a:t>” Value=“24”/&gt;</a:t>
+            </a:r>
+          </a:p>
+          <a:p>
+            <a:r>
+              <a:rPr lang="en-US" sz="1400" dirty="0"/>
+              <a:t>    &lt;Setter Property=“</a:t>
+            </a:r>
+            <a:r>
+              <a:rPr lang="en-US" sz="1400" dirty="0" err="1"/>
+              <a:t>FontFamily</a:t>
+            </a:r>
+            <a:r>
+              <a:rPr lang="en-US" sz="1400" dirty="0"/>
+              <a:t>” Value=“Comic Sans MS</a:t>
+            </a:r>
+            <a:r>
+              <a:rPr lang="en-US" sz="1400" dirty="0" smtClean="0"/>
+              <a:t>”/&gt;</a:t>
+            </a:r>
+            <a:br>
+              <a:rPr lang="en-US" sz="1400" dirty="0" smtClean="0"/>
+            </a:br>
+            <a:r>
+              <a:rPr lang="en-US" sz="1400" dirty="0" smtClean="0"/>
+              <a:t>    &lt;</a:t>
+            </a:r>
+            <a:r>
+              <a:rPr lang="en-US" sz="1400" dirty="0"/>
+              <a:t>Setter Property="Foreground" Value="Red"/&gt;</a:t>
+            </a:r>
+          </a:p>
+          <a:p>
+            <a:r>
+              <a:rPr lang="en-US" sz="1400" dirty="0"/>
+              <a:t>&lt;/Style&gt;</a:t>
+            </a:r>
+          </a:p>
+        </p:txBody>
+      </p:sp>
+      <p:pic>
+        <p:nvPicPr>
+          <p:cNvPr id="2051" name="Picture 3"/>
+          <p:cNvPicPr>
+            <a:picLocks noChangeAspect="1" noChangeArrowheads="1"/>
+          </p:cNvPicPr>
+          <p:nvPr/>
+        </p:nvPicPr>
+        <p:blipFill>
+          <a:blip r:embed="rId2">
+            <a:extLst>
+              <a:ext uri="{28A0092B-C50C-407E-A947-70E740481C1C}">
+                <a14:useLocalDpi xmlns:a14="http://schemas.microsoft.com/office/drawing/2010/main" val="0"/>
+              </a:ext>
+            </a:extLst>
+          </a:blip>
+          <a:srcRect/>
+          <a:stretch>
+            <a:fillRect/>
+          </a:stretch>
+        </p:blipFill>
+        <p:spPr bwMode="auto">
+          <a:xfrm>
+            <a:off x="1710417" y="5084533"/>
+            <a:ext cx="1809750" cy="457200"/>
+          </a:xfrm>
+          <a:prstGeom prst="rect">
+            <a:avLst/>
+          </a:prstGeom>
+          <a:noFill/>
+          <a:ln>
+            <a:noFill/>
+          </a:ln>
+          <a:effectLst/>
+          <a:extLst>
+            <a:ext uri="{909E8E84-426E-40DD-AFC4-6F175D3DCCD1}">
+              <a14:hiddenFill xmlns:a14="http://schemas.microsoft.com/office/drawing/2010/main">
+                <a:solidFill>
+                  <a:schemeClr val="accent1"/>
+                </a:solidFill>
+              </a14:hiddenFill>
+            </a:ext>
+            <a:ext uri="{91240B29-F687-4F45-9708-019B960494DF}">
+              <a14:hiddenLine xmlns:a14="http://schemas.microsoft.com/office/drawing/2010/main" w="9525">
+                <a:solidFill>
+                  <a:schemeClr val="tx1"/>
+                </a:solidFill>
+                <a:miter lim="800000"/>
+                <a:headEnd/>
+                <a:tailEnd/>
+              </a14:hiddenLine>
+            </a:ext>
+            <a:ext uri="{AF507438-7753-43E0-B8FC-AC1667EBCBE1}">
+              <a14:hiddenEffects xmlns:a14="http://schemas.microsoft.com/office/drawing/2010/main">
+                <a:effectLst>
+                  <a:outerShdw dist="35921" dir="2700000" algn="ctr" rotWithShape="0">
+                    <a:schemeClr val="bg2"/>
+                  </a:outerShdw>
+                </a:effectLst>
+              </a14:hiddenEffects>
+            </a:ext>
+          </a:extLst>
+        </p:spPr>
+      </p:pic>
+    </p:spTree>
+    <p:extLst>
+      <p:ext uri="{BB962C8B-B14F-4D97-AF65-F5344CB8AC3E}">
+        <p14:creationId xmlns:p14="http://schemas.microsoft.com/office/powerpoint/2010/main" val="3013222656"/>
+      </p:ext>
+    </p:extLst>
+  </p:cSld>
+  <p:clrMapOvr>
+    <a:masterClrMapping/>
+  </p:clrMapOvr>
+  <mc:AlternateContent xmlns:mc="http://schemas.openxmlformats.org/markup-compatibility/2006" xmlns:p14="http://schemas.microsoft.com/office/powerpoint/2010/main">
+    <mc:Choice Requires="p14">
+      <p:transition spd="slow" p14:dur="2000"/>
+    </mc:Choice>
+    <mc:Fallback xmlns="">
+      <p:transition spd="slow"/>
+    </mc:Fallback>
+  </mc:AlternateContent>
   <p:timing>
     <p:tnLst>
       <p:par>
@@ -3907,7 +4205,7 @@
 </p:sld>
 </file>
 
-<file path=ppt/slides/slide10.xml><?xml version="1.0" encoding="utf-8"?>
+<file path=ppt/slides/slide11.xml><?xml version="1.0" encoding="utf-8"?>
 <p:sld xmlns:a="http://schemas.openxmlformats.org/drawingml/2006/main" xmlns:r="http://schemas.openxmlformats.org/officeDocument/2006/relationships" xmlns:p="http://schemas.openxmlformats.org/presentationml/2006/main">
   <p:cSld>
     <p:spTree>
@@ -4102,7 +4400,7 @@
 </p:sld>
 </file>
 
-<file path=ppt/slides/slide11.xml><?xml version="1.0" encoding="utf-8"?>
+<file path=ppt/slides/slide12.xml><?xml version="1.0" encoding="utf-8"?>
 <p:sld xmlns:a="http://schemas.openxmlformats.org/drawingml/2006/main" xmlns:r="http://schemas.openxmlformats.org/officeDocument/2006/relationships" xmlns:p="http://schemas.openxmlformats.org/presentationml/2006/main">
   <p:cSld>
     <p:spTree>
@@ -4203,7 +4501,7 @@
 </p:sld>
 </file>
 
-<file path=ppt/slides/slide12.xml><?xml version="1.0" encoding="utf-8"?>
+<file path=ppt/slides/slide13.xml><?xml version="1.0" encoding="utf-8"?>
 <p:sld xmlns:a="http://schemas.openxmlformats.org/drawingml/2006/main" xmlns:r="http://schemas.openxmlformats.org/officeDocument/2006/relationships" xmlns:p="http://schemas.openxmlformats.org/presentationml/2006/main" show="0">
   <p:cSld>
     <p:spTree>
@@ -4410,7 +4708,7 @@
 </p:sld>
 </file>
 
-<file path=ppt/slides/slide13.xml><?xml version="1.0" encoding="utf-8"?>
+<file path=ppt/slides/slide14.xml><?xml version="1.0" encoding="utf-8"?>
 <p:sld xmlns:a="http://schemas.openxmlformats.org/drawingml/2006/main" xmlns:r="http://schemas.openxmlformats.org/officeDocument/2006/relationships" xmlns:p="http://schemas.openxmlformats.org/presentationml/2006/main">
   <p:cSld>
     <p:spTree>
@@ -4495,7 +4793,7 @@
 </p:sld>
 </file>
 
-<file path=ppt/slides/slide14.xml><?xml version="1.0" encoding="utf-8"?>
+<file path=ppt/slides/slide15.xml><?xml version="1.0" encoding="utf-8"?>
 <p:sld xmlns:a="http://schemas.openxmlformats.org/drawingml/2006/main" xmlns:r="http://schemas.openxmlformats.org/officeDocument/2006/relationships" xmlns:p="http://schemas.openxmlformats.org/presentationml/2006/main" show="0">
   <p:cSld>
     <p:spTree>
@@ -4702,7 +5000,7 @@
 </p:sld>
 </file>
 
-<file path=ppt/slides/slide15.xml><?xml version="1.0" encoding="utf-8"?>
+<file path=ppt/slides/slide16.xml><?xml version="1.0" encoding="utf-8"?>
 <p:sld xmlns:a="http://schemas.openxmlformats.org/drawingml/2006/main" xmlns:r="http://schemas.openxmlformats.org/officeDocument/2006/relationships" xmlns:p="http://schemas.openxmlformats.org/presentationml/2006/main">
   <p:cSld>
     <p:spTree>
@@ -4830,6 +5128,323 @@
 </file>
 
 <file path=ppt/slides/slide2.xml><?xml version="1.0" encoding="utf-8"?>
+<p:sld xmlns:a="http://schemas.openxmlformats.org/drawingml/2006/main" xmlns:r="http://schemas.openxmlformats.org/officeDocument/2006/relationships" xmlns:p="http://schemas.openxmlformats.org/presentationml/2006/main">
+  <p:cSld>
+    <p:spTree>
+      <p:nvGrpSpPr>
+        <p:cNvPr id="1" name=""/>
+        <p:cNvGrpSpPr/>
+        <p:nvPr/>
+      </p:nvGrpSpPr>
+      <p:grpSpPr>
+        <a:xfrm>
+          <a:off x="0" y="0"/>
+          <a:ext cx="0" cy="0"/>
+          <a:chOff x="0" y="0"/>
+          <a:chExt cx="0" cy="0"/>
+        </a:xfrm>
+      </p:grpSpPr>
+      <p:sp>
+        <p:nvSpPr>
+          <p:cNvPr id="2" name="Title 1"/>
+          <p:cNvSpPr>
+            <a:spLocks noGrp="1"/>
+          </p:cNvSpPr>
+          <p:nvPr>
+            <p:ph type="ctrTitle"/>
+          </p:nvPr>
+        </p:nvSpPr>
+        <p:spPr/>
+        <p:txBody>
+          <a:bodyPr/>
+          <a:lstStyle/>
+          <a:p>
+            <a:r>
+              <a:rPr lang="en-US" smtClean="0"/>
+              <a:t>XAML: Styles and Templates</a:t>
+            </a:r>
+            <a:endParaRPr lang="en-US" dirty="0"/>
+          </a:p>
+        </p:txBody>
+      </p:sp>
+      <p:sp>
+        <p:nvSpPr>
+          <p:cNvPr id="3" name="Subtitle 2"/>
+          <p:cNvSpPr>
+            <a:spLocks noGrp="1"/>
+          </p:cNvSpPr>
+          <p:nvPr>
+            <p:ph type="subTitle" idx="1"/>
+          </p:nvPr>
+        </p:nvSpPr>
+        <p:spPr/>
+        <p:txBody>
+          <a:bodyPr/>
+          <a:lstStyle/>
+          <a:p>
+            <a:r>
+              <a:rPr lang="en-US" dirty="0" smtClean="0"/>
+              <a:t>Central Ohio Day of .NET</a:t>
+            </a:r>
+          </a:p>
+          <a:p>
+            <a:r>
+              <a:rPr lang="en-US" dirty="0" smtClean="0"/>
+              <a:t>December 8, 2012</a:t>
+            </a:r>
+            <a:endParaRPr lang="en-US" dirty="0"/>
+          </a:p>
+        </p:txBody>
+      </p:sp>
+      <p:sp>
+        <p:nvSpPr>
+          <p:cNvPr id="4" name="Subtitle 2"/>
+          <p:cNvSpPr txBox="1">
+            <a:spLocks/>
+          </p:cNvSpPr>
+          <p:nvPr/>
+        </p:nvSpPr>
+        <p:spPr>
+          <a:xfrm>
+            <a:off x="6477000" y="5580460"/>
+            <a:ext cx="2514600" cy="1143000"/>
+          </a:xfrm>
+          <a:prstGeom prst="rect">
+            <a:avLst/>
+          </a:prstGeom>
+        </p:spPr>
+        <p:txBody>
+          <a:bodyPr vert="horz" lIns="91440" tIns="45720" rIns="91440" bIns="45720" rtlCol="0">
+            <a:noAutofit/>
+          </a:bodyPr>
+          <a:lstStyle>
+            <a:lvl1pPr marL="0" indent="0" algn="ctr" defTabSz="914400" rtl="0" eaLnBrk="1" latinLnBrk="0" hangingPunct="1">
+              <a:spcBef>
+                <a:spcPct val="20000"/>
+              </a:spcBef>
+              <a:buFont typeface="Arial" pitchFamily="34" charset="0"/>
+              <a:buNone/>
+              <a:defRPr sz="3200" kern="1200">
+                <a:solidFill>
+                  <a:schemeClr val="tx1">
+                    <a:tint val="75000"/>
+                  </a:schemeClr>
+                </a:solidFill>
+                <a:latin typeface="+mn-lt"/>
+                <a:ea typeface="+mn-ea"/>
+                <a:cs typeface="+mn-cs"/>
+              </a:defRPr>
+            </a:lvl1pPr>
+            <a:lvl2pPr marL="457200" indent="0" algn="ctr" defTabSz="914400" rtl="0" eaLnBrk="1" latinLnBrk="0" hangingPunct="1">
+              <a:spcBef>
+                <a:spcPct val="20000"/>
+              </a:spcBef>
+              <a:buFont typeface="Arial" pitchFamily="34" charset="0"/>
+              <a:buNone/>
+              <a:defRPr sz="2800" kern="1200">
+                <a:solidFill>
+                  <a:schemeClr val="tx1">
+                    <a:tint val="75000"/>
+                  </a:schemeClr>
+                </a:solidFill>
+                <a:latin typeface="+mn-lt"/>
+                <a:ea typeface="+mn-ea"/>
+                <a:cs typeface="+mn-cs"/>
+              </a:defRPr>
+            </a:lvl2pPr>
+            <a:lvl3pPr marL="914400" indent="0" algn="ctr" defTabSz="914400" rtl="0" eaLnBrk="1" latinLnBrk="0" hangingPunct="1">
+              <a:spcBef>
+                <a:spcPct val="20000"/>
+              </a:spcBef>
+              <a:buFont typeface="Arial" pitchFamily="34" charset="0"/>
+              <a:buNone/>
+              <a:defRPr sz="2400" kern="1200">
+                <a:solidFill>
+                  <a:schemeClr val="tx1">
+                    <a:tint val="75000"/>
+                  </a:schemeClr>
+                </a:solidFill>
+                <a:latin typeface="+mn-lt"/>
+                <a:ea typeface="+mn-ea"/>
+                <a:cs typeface="+mn-cs"/>
+              </a:defRPr>
+            </a:lvl3pPr>
+            <a:lvl4pPr marL="1371600" indent="0" algn="ctr" defTabSz="914400" rtl="0" eaLnBrk="1" latinLnBrk="0" hangingPunct="1">
+              <a:spcBef>
+                <a:spcPct val="20000"/>
+              </a:spcBef>
+              <a:buFont typeface="Arial" pitchFamily="34" charset="0"/>
+              <a:buNone/>
+              <a:defRPr sz="2000" kern="1200">
+                <a:solidFill>
+                  <a:schemeClr val="tx1">
+                    <a:tint val="75000"/>
+                  </a:schemeClr>
+                </a:solidFill>
+                <a:latin typeface="+mn-lt"/>
+                <a:ea typeface="+mn-ea"/>
+                <a:cs typeface="+mn-cs"/>
+              </a:defRPr>
+            </a:lvl4pPr>
+            <a:lvl5pPr marL="1828800" indent="0" algn="ctr" defTabSz="914400" rtl="0" eaLnBrk="1" latinLnBrk="0" hangingPunct="1">
+              <a:spcBef>
+                <a:spcPct val="20000"/>
+              </a:spcBef>
+              <a:buFont typeface="Arial" pitchFamily="34" charset="0"/>
+              <a:buNone/>
+              <a:defRPr sz="2000" kern="1200">
+                <a:solidFill>
+                  <a:schemeClr val="tx1">
+                    <a:tint val="75000"/>
+                  </a:schemeClr>
+                </a:solidFill>
+                <a:latin typeface="+mn-lt"/>
+                <a:ea typeface="+mn-ea"/>
+                <a:cs typeface="+mn-cs"/>
+              </a:defRPr>
+            </a:lvl5pPr>
+            <a:lvl6pPr marL="2286000" indent="0" algn="ctr" defTabSz="914400" rtl="0" eaLnBrk="1" latinLnBrk="0" hangingPunct="1">
+              <a:spcBef>
+                <a:spcPct val="20000"/>
+              </a:spcBef>
+              <a:buFont typeface="Arial" pitchFamily="34" charset="0"/>
+              <a:buNone/>
+              <a:defRPr sz="2000" kern="1200">
+                <a:solidFill>
+                  <a:schemeClr val="tx1">
+                    <a:tint val="75000"/>
+                  </a:schemeClr>
+                </a:solidFill>
+                <a:latin typeface="+mn-lt"/>
+                <a:ea typeface="+mn-ea"/>
+                <a:cs typeface="+mn-cs"/>
+              </a:defRPr>
+            </a:lvl6pPr>
+            <a:lvl7pPr marL="2743200" indent="0" algn="ctr" defTabSz="914400" rtl="0" eaLnBrk="1" latinLnBrk="0" hangingPunct="1">
+              <a:spcBef>
+                <a:spcPct val="20000"/>
+              </a:spcBef>
+              <a:buFont typeface="Arial" pitchFamily="34" charset="0"/>
+              <a:buNone/>
+              <a:defRPr sz="2000" kern="1200">
+                <a:solidFill>
+                  <a:schemeClr val="tx1">
+                    <a:tint val="75000"/>
+                  </a:schemeClr>
+                </a:solidFill>
+                <a:latin typeface="+mn-lt"/>
+                <a:ea typeface="+mn-ea"/>
+                <a:cs typeface="+mn-cs"/>
+              </a:defRPr>
+            </a:lvl7pPr>
+            <a:lvl8pPr marL="3200400" indent="0" algn="ctr" defTabSz="914400" rtl="0" eaLnBrk="1" latinLnBrk="0" hangingPunct="1">
+              <a:spcBef>
+                <a:spcPct val="20000"/>
+              </a:spcBef>
+              <a:buFont typeface="Arial" pitchFamily="34" charset="0"/>
+              <a:buNone/>
+              <a:defRPr sz="2000" kern="1200">
+                <a:solidFill>
+                  <a:schemeClr val="tx1">
+                    <a:tint val="75000"/>
+                  </a:schemeClr>
+                </a:solidFill>
+                <a:latin typeface="+mn-lt"/>
+                <a:ea typeface="+mn-ea"/>
+                <a:cs typeface="+mn-cs"/>
+              </a:defRPr>
+            </a:lvl8pPr>
+            <a:lvl9pPr marL="3657600" indent="0" algn="ctr" defTabSz="914400" rtl="0" eaLnBrk="1" latinLnBrk="0" hangingPunct="1">
+              <a:spcBef>
+                <a:spcPct val="20000"/>
+              </a:spcBef>
+              <a:buFont typeface="Arial" pitchFamily="34" charset="0"/>
+              <a:buNone/>
+              <a:defRPr sz="2000" kern="1200">
+                <a:solidFill>
+                  <a:schemeClr val="tx1">
+                    <a:tint val="75000"/>
+                  </a:schemeClr>
+                </a:solidFill>
+                <a:latin typeface="+mn-lt"/>
+                <a:ea typeface="+mn-ea"/>
+                <a:cs typeface="+mn-cs"/>
+              </a:defRPr>
+            </a:lvl9pPr>
+          </a:lstStyle>
+          <a:p>
+            <a:pPr algn="r"/>
+            <a:r>
+              <a:rPr lang="en-US" sz="1400" dirty="0" smtClean="0"/>
+              <a:t/>
+            </a:r>
+            <a:br>
+              <a:rPr lang="en-US" sz="1400" dirty="0" smtClean="0"/>
+            </a:br>
+            <a:r>
+              <a:rPr lang="en-US" sz="1400" dirty="0" smtClean="0"/>
+              <a:t>Michael Eaton</a:t>
+            </a:r>
+          </a:p>
+          <a:p>
+            <a:pPr algn="r"/>
+            <a:r>
+              <a:rPr lang="en-US" sz="1400" dirty="0" smtClean="0"/>
+              <a:t>@</a:t>
+            </a:r>
+            <a:r>
+              <a:rPr lang="en-US" sz="1400" dirty="0" err="1" smtClean="0"/>
+              <a:t>mjeaton</a:t>
+            </a:r>
+            <a:endParaRPr lang="en-US" sz="1400" dirty="0"/>
+          </a:p>
+        </p:txBody>
+      </p:sp>
+      <p:pic>
+        <p:nvPicPr>
+          <p:cNvPr id="5" name="Picture 4" descr="Validus_Color_Trans.jpg"/>
+          <p:cNvPicPr>
+            <a:picLocks noChangeAspect="1"/>
+          </p:cNvPicPr>
+          <p:nvPr/>
+        </p:nvPicPr>
+        <p:blipFill>
+          <a:blip r:embed="rId2" cstate="print"/>
+          <a:stretch>
+            <a:fillRect/>
+          </a:stretch>
+        </p:blipFill>
+        <p:spPr>
+          <a:xfrm>
+            <a:off x="215900" y="5857186"/>
+            <a:ext cx="2057400" cy="866274"/>
+          </a:xfrm>
+          <a:prstGeom prst="rect">
+            <a:avLst/>
+          </a:prstGeom>
+        </p:spPr>
+      </p:pic>
+    </p:spTree>
+    <p:extLst>
+      <p:ext uri="{BB962C8B-B14F-4D97-AF65-F5344CB8AC3E}">
+        <p14:creationId xmlns:p14="http://schemas.microsoft.com/office/powerpoint/2010/main" val="1693764814"/>
+      </p:ext>
+    </p:extLst>
+  </p:cSld>
+  <p:clrMapOvr>
+    <a:masterClrMapping/>
+  </p:clrMapOvr>
+  <p:timing>
+    <p:tnLst>
+      <p:par>
+        <p:cTn id="1" dur="indefinite" restart="never" nodeType="tmRoot"/>
+      </p:par>
+    </p:tnLst>
+  </p:timing>
+</p:sld>
+</file>
+
+<file path=ppt/slides/slide3.xml><?xml version="1.0" encoding="utf-8"?>
 <p:sld xmlns:a="http://schemas.openxmlformats.org/drawingml/2006/main" xmlns:r="http://schemas.openxmlformats.org/officeDocument/2006/relationships" xmlns:p="http://schemas.openxmlformats.org/presentationml/2006/main">
   <p:cSld>
     <p:spTree>
@@ -4895,7 +5510,7 @@
 </p:sld>
 </file>
 
-<file path=ppt/slides/slide3.xml><?xml version="1.0" encoding="utf-8"?>
+<file path=ppt/slides/slide4.xml><?xml version="1.0" encoding="utf-8"?>
 <p:sld xmlns:a="http://schemas.openxmlformats.org/drawingml/2006/main" xmlns:r="http://schemas.openxmlformats.org/officeDocument/2006/relationships" xmlns:p="http://schemas.openxmlformats.org/presentationml/2006/main">
   <p:cSld>
     <p:spTree>
@@ -5051,7 +5666,7 @@
 </p:sld>
 </file>
 
-<file path=ppt/slides/slide4.xml><?xml version="1.0" encoding="utf-8"?>
+<file path=ppt/slides/slide5.xml><?xml version="1.0" encoding="utf-8"?>
 <p:sld xmlns:a="http://schemas.openxmlformats.org/drawingml/2006/main" xmlns:r="http://schemas.openxmlformats.org/officeDocument/2006/relationships" xmlns:p="http://schemas.openxmlformats.org/presentationml/2006/main">
   <p:cSld>
     <p:spTree>
@@ -5460,7 +6075,7 @@
 </p:sld>
 </file>
 
-<file path=ppt/slides/slide5.xml><?xml version="1.0" encoding="utf-8"?>
+<file path=ppt/slides/slide6.xml><?xml version="1.0" encoding="utf-8"?>
 <p:sld xmlns:a="http://schemas.openxmlformats.org/drawingml/2006/main" xmlns:r="http://schemas.openxmlformats.org/officeDocument/2006/relationships" xmlns:p="http://schemas.openxmlformats.org/presentationml/2006/main">
   <p:cSld>
     <p:spTree>
@@ -5642,81 +6257,6 @@
     <p:extLst>
       <p:ext uri="{BB962C8B-B14F-4D97-AF65-F5344CB8AC3E}">
         <p14:creationId xmlns:p14="http://schemas.microsoft.com/office/powerpoint/2010/main" val="4004120798"/>
-      </p:ext>
-    </p:extLst>
-  </p:cSld>
-  <p:clrMapOvr>
-    <a:masterClrMapping/>
-  </p:clrMapOvr>
-  <p:timing>
-    <p:tnLst>
-      <p:par>
-        <p:cTn id="1" dur="indefinite" restart="never" nodeType="tmRoot"/>
-      </p:par>
-    </p:tnLst>
-  </p:timing>
-</p:sld>
-</file>
-
-<file path=ppt/slides/slide6.xml><?xml version="1.0" encoding="utf-8"?>
-<p:sld xmlns:a="http://schemas.openxmlformats.org/drawingml/2006/main" xmlns:r="http://schemas.openxmlformats.org/officeDocument/2006/relationships" xmlns:p="http://schemas.openxmlformats.org/presentationml/2006/main">
-  <p:cSld>
-    <p:spTree>
-      <p:nvGrpSpPr>
-        <p:cNvPr id="1" name=""/>
-        <p:cNvGrpSpPr/>
-        <p:nvPr/>
-      </p:nvGrpSpPr>
-      <p:grpSpPr>
-        <a:xfrm>
-          <a:off x="0" y="0"/>
-          <a:ext cx="0" cy="0"/>
-          <a:chOff x="0" y="0"/>
-          <a:chExt cx="0" cy="0"/>
-        </a:xfrm>
-      </p:grpSpPr>
-      <p:sp>
-        <p:nvSpPr>
-          <p:cNvPr id="3" name="Content Placeholder 2"/>
-          <p:cNvSpPr>
-            <a:spLocks noGrp="1"/>
-          </p:cNvSpPr>
-          <p:nvPr>
-            <p:ph idx="1"/>
-          </p:nvPr>
-        </p:nvSpPr>
-        <p:spPr>
-          <a:xfrm>
-            <a:off x="457200" y="2678510"/>
-            <a:ext cx="8229600" cy="1500981"/>
-          </a:xfrm>
-        </p:spPr>
-        <p:txBody>
-          <a:bodyPr>
-            <a:normAutofit fontScale="62500" lnSpcReduction="20000"/>
-          </a:bodyPr>
-          <a:lstStyle/>
-          <a:p>
-            <a:pPr marL="0" indent="0" algn="ctr">
-              <a:buNone/>
-            </a:pPr>
-            <a:r>
-              <a:rPr lang="en-US" sz="9600" dirty="0" smtClean="0"/>
-              <a:t>http://about.me/mjeaton</a:t>
-            </a:r>
-          </a:p>
-          <a:p>
-            <a:pPr marL="0" indent="0">
-              <a:buNone/>
-            </a:pPr>
-            <a:endParaRPr lang="en-US" dirty="0"/>
-          </a:p>
-        </p:txBody>
-      </p:sp>
-    </p:spTree>
-    <p:extLst>
-      <p:ext uri="{BB962C8B-B14F-4D97-AF65-F5344CB8AC3E}">
-        <p14:creationId xmlns:p14="http://schemas.microsoft.com/office/powerpoint/2010/main" val="2841772061"/>
       </p:ext>
     </p:extLst>
   </p:cSld>
@@ -5752,29 +6292,6 @@
       </p:grpSpPr>
       <p:sp>
         <p:nvSpPr>
-          <p:cNvPr id="2" name="Title 1"/>
-          <p:cNvSpPr>
-            <a:spLocks noGrp="1"/>
-          </p:cNvSpPr>
-          <p:nvPr>
-            <p:ph type="title"/>
-          </p:nvPr>
-        </p:nvSpPr>
-        <p:spPr/>
-        <p:txBody>
-          <a:bodyPr/>
-          <a:lstStyle/>
-          <a:p>
-            <a:r>
-              <a:rPr lang="en-US" dirty="0" smtClean="0"/>
-              <a:t>Styles and Templates</a:t>
-            </a:r>
-            <a:endParaRPr lang="en-US" dirty="0"/>
-          </a:p>
-        </p:txBody>
-      </p:sp>
-      <p:sp>
-        <p:nvSpPr>
           <p:cNvPr id="3" name="Content Placeholder 2"/>
           <p:cNvSpPr>
             <a:spLocks noGrp="1"/>
@@ -5783,32 +6300,38 @@
             <p:ph idx="1"/>
           </p:nvPr>
         </p:nvSpPr>
-        <p:spPr/>
+        <p:spPr>
+          <a:xfrm>
+            <a:off x="457200" y="2678510"/>
+            <a:ext cx="8229600" cy="1500981"/>
+          </a:xfrm>
+        </p:spPr>
         <p:txBody>
           <a:bodyPr>
-            <a:normAutofit/>
+            <a:normAutofit fontScale="62500" lnSpcReduction="20000"/>
           </a:bodyPr>
           <a:lstStyle/>
           <a:p>
-            <a:pPr lvl="1"/>
-            <a:r>
-              <a:rPr lang="en-US" dirty="0" smtClean="0"/>
-              <a:t>Controls the look and feel of an application</a:t>
-            </a:r>
-          </a:p>
-          <a:p>
-            <a:pPr lvl="1"/>
-            <a:r>
-              <a:rPr lang="en-US" dirty="0" smtClean="0"/>
-              <a:t>Can completely change how a control looks</a:t>
-            </a:r>
+            <a:pPr marL="0" indent="0" algn="ctr">
+              <a:buNone/>
+            </a:pPr>
+            <a:r>
+              <a:rPr lang="en-US" sz="9600" dirty="0" smtClean="0"/>
+              <a:t>http://about.me/mjeaton</a:t>
+            </a:r>
+          </a:p>
+          <a:p>
+            <a:pPr marL="0" indent="0">
+              <a:buNone/>
+            </a:pPr>
+            <a:endParaRPr lang="en-US" dirty="0"/>
           </a:p>
         </p:txBody>
       </p:sp>
     </p:spTree>
     <p:extLst>
       <p:ext uri="{BB962C8B-B14F-4D97-AF65-F5344CB8AC3E}">
-        <p14:creationId xmlns:p14="http://schemas.microsoft.com/office/powerpoint/2010/main" val="3791491047"/>
+        <p14:creationId xmlns:p14="http://schemas.microsoft.com/office/powerpoint/2010/main" val="2841772061"/>
       </p:ext>
     </p:extLst>
   </p:cSld>
@@ -5859,7 +6382,7 @@
           <a:p>
             <a:r>
               <a:rPr lang="en-US" dirty="0" smtClean="0"/>
-              <a:t>Styles</a:t>
+              <a:t>Styles and Templates</a:t>
             </a:r>
             <a:endParaRPr lang="en-US" dirty="0"/>
           </a:p>
@@ -5877,62 +6400,30 @@
         </p:nvSpPr>
         <p:spPr/>
         <p:txBody>
-          <a:bodyPr/>
+          <a:bodyPr>
+            <a:normAutofit/>
+          </a:bodyPr>
           <a:lstStyle/>
           <a:p>
             <a:pPr lvl="1"/>
             <a:r>
-              <a:rPr lang="en-US" dirty="0"/>
-              <a:t>C</a:t>
-            </a:r>
-            <a:r>
               <a:rPr lang="en-US" dirty="0" smtClean="0"/>
-              <a:t>an </a:t>
-            </a:r>
-            <a:r>
-              <a:rPr lang="en-US" dirty="0"/>
-              <a:t>be applied to any object which derives from </a:t>
-            </a:r>
-            <a:r>
-              <a:rPr lang="en-US" dirty="0" err="1"/>
-              <a:t>FrameworkElement</a:t>
-            </a:r>
-            <a:r>
-              <a:rPr lang="en-US" dirty="0"/>
-              <a:t> or </a:t>
-            </a:r>
-            <a:r>
-              <a:rPr lang="en-US" dirty="0" err="1"/>
-              <a:t>FrameworkContentElement</a:t>
-            </a:r>
-            <a:r>
-              <a:rPr lang="en-US" dirty="0"/>
-              <a:t>, both of which expose a public property named Style.</a:t>
+              <a:t>Controls the look and feel of an application</a:t>
             </a:r>
           </a:p>
           <a:p>
             <a:pPr lvl="1"/>
             <a:r>
-              <a:rPr lang="en-US" dirty="0"/>
-              <a:t>Local / global</a:t>
-            </a:r>
-          </a:p>
-          <a:p>
-            <a:pPr lvl="1"/>
-            <a:r>
-              <a:rPr lang="en-US" dirty="0"/>
-              <a:t>Defines the appearance of a control</a:t>
-            </a:r>
-          </a:p>
-          <a:p>
-            <a:endParaRPr lang="en-US" dirty="0"/>
+              <a:rPr lang="en-US" dirty="0" smtClean="0"/>
+              <a:t>Can completely change how a control looks</a:t>
+            </a:r>
           </a:p>
         </p:txBody>
       </p:sp>
     </p:spTree>
     <p:extLst>
       <p:ext uri="{BB962C8B-B14F-4D97-AF65-F5344CB8AC3E}">
-        <p14:creationId xmlns:p14="http://schemas.microsoft.com/office/powerpoint/2010/main" val="518145059"/>
+        <p14:creationId xmlns:p14="http://schemas.microsoft.com/office/powerpoint/2010/main" val="3791491047"/>
       </p:ext>
     </p:extLst>
   </p:cSld>
@@ -6001,287 +6492,68 @@
         </p:nvSpPr>
         <p:spPr/>
         <p:txBody>
-          <a:bodyPr>
-            <a:normAutofit/>
-          </a:bodyPr>
+          <a:bodyPr/>
           <a:lstStyle/>
           <a:p>
-            <a:r>
-              <a:rPr lang="en-US" sz="2800" dirty="0" smtClean="0"/>
-              <a:t>Styles can live in several places</a:t>
-            </a:r>
-          </a:p>
-          <a:p>
             <a:pPr lvl="1"/>
             <a:r>
-              <a:rPr lang="en-US" sz="2000" dirty="0" err="1" smtClean="0"/>
-              <a:t>App.xaml</a:t>
-            </a:r>
-            <a:endParaRPr lang="en-US" sz="2000" dirty="0" smtClean="0"/>
-          </a:p>
-          <a:p>
-            <a:pPr lvl="2"/>
-            <a:r>
-              <a:rPr lang="en-US" sz="1600" dirty="0" smtClean="0"/>
-              <a:t>&lt;</a:t>
-            </a:r>
-            <a:r>
-              <a:rPr lang="en-US" sz="1600" dirty="0" err="1" smtClean="0"/>
-              <a:t>Application.Resources</a:t>
-            </a:r>
-            <a:r>
-              <a:rPr lang="en-US" sz="1600" dirty="0" smtClean="0"/>
-              <a:t>&gt;</a:t>
-            </a:r>
-          </a:p>
-          <a:p>
-            <a:pPr lvl="3"/>
-            <a:r>
-              <a:rPr lang="en-US" sz="1200" dirty="0" smtClean="0"/>
-              <a:t>Available globally</a:t>
+              <a:rPr lang="en-US" dirty="0"/>
+              <a:t>C</a:t>
+            </a:r>
+            <a:r>
+              <a:rPr lang="en-US" dirty="0" smtClean="0"/>
+              <a:t>an </a:t>
+            </a:r>
+            <a:r>
+              <a:rPr lang="en-US" dirty="0"/>
+              <a:t>be applied to any object which derives from </a:t>
+            </a:r>
+            <a:r>
+              <a:rPr lang="en-US" dirty="0" err="1"/>
+              <a:t>FrameworkElement</a:t>
+            </a:r>
+            <a:r>
+              <a:rPr lang="en-US" dirty="0"/>
+              <a:t> or </a:t>
+            </a:r>
+            <a:r>
+              <a:rPr lang="en-US" dirty="0" err="1"/>
+              <a:t>FrameworkContentElement</a:t>
+            </a:r>
+            <a:r>
+              <a:rPr lang="en-US" dirty="0"/>
+              <a:t>, both of which expose a public property named Style.</a:t>
             </a:r>
           </a:p>
           <a:p>
             <a:pPr lvl="1"/>
             <a:r>
-              <a:rPr lang="en-US" sz="2000" dirty="0" smtClean="0"/>
-              <a:t>&lt;</a:t>
-            </a:r>
-            <a:r>
-              <a:rPr lang="en-US" sz="2000" dirty="0" err="1" smtClean="0"/>
-              <a:t>Window|Page|UserControl.Resources</a:t>
-            </a:r>
-            <a:r>
-              <a:rPr lang="en-US" sz="2000" dirty="0" smtClean="0"/>
-              <a:t>/&gt;</a:t>
-            </a:r>
-          </a:p>
-          <a:p>
-            <a:pPr lvl="2"/>
-            <a:r>
-              <a:rPr lang="en-US" sz="1600" dirty="0" smtClean="0"/>
-              <a:t>Available only within that particular window, page or </a:t>
-            </a:r>
-            <a:r>
-              <a:rPr lang="en-US" sz="1600" dirty="0" err="1" smtClean="0"/>
-              <a:t>usercontrol</a:t>
-            </a:r>
-            <a:endParaRPr lang="en-US" sz="1600" dirty="0" smtClean="0"/>
+              <a:rPr lang="en-US" dirty="0"/>
+              <a:t>Local / global</a:t>
+            </a:r>
           </a:p>
           <a:p>
             <a:pPr lvl="1"/>
             <a:r>
-              <a:rPr lang="en-US" sz="2000" dirty="0" smtClean="0"/>
-              <a:t>&lt;</a:t>
-            </a:r>
-            <a:r>
-              <a:rPr lang="en-US" sz="2000" dirty="0" err="1" smtClean="0"/>
-              <a:t>Control.Resources</a:t>
-            </a:r>
-            <a:r>
-              <a:rPr lang="en-US" sz="2000" dirty="0" smtClean="0"/>
-              <a:t>&gt;</a:t>
-            </a:r>
-          </a:p>
-          <a:p>
-            <a:pPr lvl="2"/>
-            <a:r>
-              <a:rPr lang="en-US" sz="1600" dirty="0" smtClean="0"/>
-              <a:t>&lt;</a:t>
-            </a:r>
-            <a:r>
-              <a:rPr lang="en-US" sz="1600" dirty="0" err="1" smtClean="0"/>
-              <a:t>Button.Resources</a:t>
-            </a:r>
-            <a:r>
-              <a:rPr lang="en-US" sz="1600" dirty="0" smtClean="0"/>
-              <a:t>&gt;, &lt;</a:t>
-            </a:r>
-            <a:r>
-              <a:rPr lang="en-US" sz="1600" dirty="0" err="1" smtClean="0"/>
-              <a:t>Grid.Resources</a:t>
-            </a:r>
-            <a:r>
-              <a:rPr lang="en-US" sz="1600" dirty="0" smtClean="0"/>
-              <a:t>&gt;, etc.</a:t>
-            </a:r>
-          </a:p>
-          <a:p>
-            <a:pPr lvl="2"/>
-            <a:r>
-              <a:rPr lang="en-US" sz="1600" dirty="0" smtClean="0"/>
-              <a:t>Only available within the context of that particular control</a:t>
-            </a:r>
-          </a:p>
-        </p:txBody>
-      </p:sp>
-      <p:sp>
-        <p:nvSpPr>
-          <p:cNvPr id="5" name="Rectangle 4"/>
-          <p:cNvSpPr/>
-          <p:nvPr/>
-        </p:nvSpPr>
-        <p:spPr>
-          <a:xfrm>
-            <a:off x="4038600" y="4728358"/>
-            <a:ext cx="4572000" cy="1169551"/>
-          </a:xfrm>
-          <a:prstGeom prst="rect">
-            <a:avLst/>
-          </a:prstGeom>
-        </p:spPr>
-        <p:txBody>
-          <a:bodyPr>
-            <a:spAutoFit/>
-          </a:bodyPr>
-          <a:lstStyle/>
-          <a:p>
-            <a:r>
-              <a:rPr lang="en-US" sz="1400" dirty="0"/>
-              <a:t>&lt;Style </a:t>
-            </a:r>
-            <a:r>
-              <a:rPr lang="en-US" sz="1400" dirty="0" err="1"/>
-              <a:t>TargetType</a:t>
-            </a:r>
-            <a:r>
-              <a:rPr lang="en-US" sz="1400" dirty="0"/>
-              <a:t>=“Button”&gt;</a:t>
-            </a:r>
-          </a:p>
-          <a:p>
-            <a:r>
-              <a:rPr lang="en-US" sz="1400" dirty="0"/>
-              <a:t>    &lt;Setter Property=“</a:t>
-            </a:r>
-            <a:r>
-              <a:rPr lang="en-US" sz="1400" dirty="0" err="1"/>
-              <a:t>FontSize</a:t>
-            </a:r>
-            <a:r>
-              <a:rPr lang="en-US" sz="1400" dirty="0"/>
-              <a:t>” Value=“24”/&gt;</a:t>
-            </a:r>
-          </a:p>
-          <a:p>
-            <a:r>
-              <a:rPr lang="en-US" sz="1400" dirty="0"/>
-              <a:t>    &lt;Setter Property=“</a:t>
-            </a:r>
-            <a:r>
-              <a:rPr lang="en-US" sz="1400" dirty="0" err="1"/>
-              <a:t>FontFamily</a:t>
-            </a:r>
-            <a:r>
-              <a:rPr lang="en-US" sz="1400" dirty="0"/>
-              <a:t>” Value=“Comic Sans MS</a:t>
-            </a:r>
-            <a:r>
-              <a:rPr lang="en-US" sz="1400" dirty="0" smtClean="0"/>
-              <a:t>”/&gt;</a:t>
-            </a:r>
-            <a:br>
-              <a:rPr lang="en-US" sz="1400" dirty="0" smtClean="0"/>
-            </a:br>
-            <a:r>
-              <a:rPr lang="en-US" sz="1400" dirty="0" smtClean="0"/>
-              <a:t>    &lt;</a:t>
-            </a:r>
-            <a:r>
-              <a:rPr lang="en-US" sz="1400" dirty="0"/>
-              <a:t>Setter Property="Foreground" Value="Red"/&gt;</a:t>
-            </a:r>
-          </a:p>
-          <a:p>
-            <a:r>
-              <a:rPr lang="en-US" sz="1400" dirty="0"/>
-              <a:t>&lt;/Style&gt;</a:t>
-            </a:r>
-          </a:p>
-        </p:txBody>
-      </p:sp>
-      <p:pic>
-        <p:nvPicPr>
-          <p:cNvPr id="2051" name="Picture 3"/>
-          <p:cNvPicPr>
-            <a:picLocks noChangeAspect="1" noChangeArrowheads="1"/>
-          </p:cNvPicPr>
-          <p:nvPr/>
-        </p:nvPicPr>
-        <p:blipFill>
-          <a:blip r:embed="rId2">
-            <a:extLst>
-              <a:ext uri="{28A0092B-C50C-407E-A947-70E740481C1C}">
-                <a14:useLocalDpi xmlns:a14="http://schemas.microsoft.com/office/drawing/2010/main" val="0"/>
-              </a:ext>
-            </a:extLst>
-          </a:blip>
-          <a:srcRect/>
-          <a:stretch>
-            <a:fillRect/>
-          </a:stretch>
-        </p:blipFill>
-        <p:spPr bwMode="auto">
-          <a:xfrm>
-            <a:off x="1710417" y="5084533"/>
-            <a:ext cx="1809750" cy="457200"/>
-          </a:xfrm>
-          <a:prstGeom prst="rect">
-            <a:avLst/>
-          </a:prstGeom>
-          <a:noFill/>
-          <a:ln>
-            <a:noFill/>
-          </a:ln>
-          <a:effectLst/>
-          <a:extLst>
-            <a:ext uri="{909E8E84-426E-40DD-AFC4-6F175D3DCCD1}">
-              <a14:hiddenFill xmlns:a14="http://schemas.microsoft.com/office/drawing/2010/main">
-                <a:solidFill>
-                  <a:schemeClr val="accent1"/>
-                </a:solidFill>
-              </a14:hiddenFill>
-            </a:ext>
-            <a:ext uri="{91240B29-F687-4F45-9708-019B960494DF}">
-              <a14:hiddenLine xmlns:a14="http://schemas.microsoft.com/office/drawing/2010/main" w="9525">
-                <a:solidFill>
-                  <a:schemeClr val="tx1"/>
-                </a:solidFill>
-                <a:miter lim="800000"/>
-                <a:headEnd/>
-                <a:tailEnd/>
-              </a14:hiddenLine>
-            </a:ext>
-            <a:ext uri="{AF507438-7753-43E0-B8FC-AC1667EBCBE1}">
-              <a14:hiddenEffects xmlns:a14="http://schemas.microsoft.com/office/drawing/2010/main">
-                <a:effectLst>
-                  <a:outerShdw dist="35921" dir="2700000" algn="ctr" rotWithShape="0">
-                    <a:schemeClr val="bg2"/>
-                  </a:outerShdw>
-                </a:effectLst>
-              </a14:hiddenEffects>
-            </a:ext>
-          </a:extLst>
-        </p:spPr>
-      </p:pic>
+              <a:rPr lang="en-US" dirty="0"/>
+              <a:t>Defines the appearance of a control</a:t>
+            </a:r>
+          </a:p>
+          <a:p>
+            <a:endParaRPr lang="en-US" dirty="0"/>
+          </a:p>
+        </p:txBody>
+      </p:sp>
     </p:spTree>
     <p:extLst>
       <p:ext uri="{BB962C8B-B14F-4D97-AF65-F5344CB8AC3E}">
-        <p14:creationId xmlns:p14="http://schemas.microsoft.com/office/powerpoint/2010/main" val="3013222656"/>
+        <p14:creationId xmlns:p14="http://schemas.microsoft.com/office/powerpoint/2010/main" val="518145059"/>
       </p:ext>
     </p:extLst>
   </p:cSld>
   <p:clrMapOvr>
     <a:masterClrMapping/>
   </p:clrMapOvr>
-  <mc:AlternateContent xmlns:mc="http://schemas.openxmlformats.org/markup-compatibility/2006" xmlns:p14="http://schemas.microsoft.com/office/powerpoint/2010/main">
-    <mc:Choice Requires="p14">
-      <p:transition spd="slow" p14:dur="2000"/>
-    </mc:Choice>
-    <mc:Fallback xmlns="">
-      <p:transition spd="slow"/>
-    </mc:Fallback>
-  </mc:AlternateContent>
   <p:timing>
     <p:tnLst>
       <p:par>

</xml_diff>